<commit_message>
update documentation and script
</commit_message>
<xml_diff>
--- a/Documentation/Introduction to Python.pptx
+++ b/Documentation/Introduction to Python.pptx
@@ -5150,7 +5150,7 @@
                 <a:latin typeface="Times New Roman" panose="02020603050405020304" pitchFamily="18" charset="0"/>
                 <a:cs typeface="Times New Roman" panose="02020603050405020304" pitchFamily="18" charset="0"/>
               </a:rPr>
-              <a:t>Contoh : </a:t>
+              <a:t>Example : </a:t>
             </a:r>
           </a:p>
         </p:txBody>
@@ -5357,7 +5357,21 @@
                 <a:latin typeface="Times New Roman" panose="02020603050405020304" pitchFamily="18" charset="0"/>
                 <a:cs typeface="Times New Roman" panose="02020603050405020304" pitchFamily="18" charset="0"/>
               </a:rPr>
-              <a:t>There is a key and that separated with semicolon(:). It’s mutable.</a:t>
+              <a:t>There is a key and value that separated </a:t>
+            </a:r>
+            <a:r>
+              <a:rPr lang="id-ID">
+                <a:latin typeface="Times New Roman" panose="02020603050405020304" pitchFamily="18" charset="0"/>
+                <a:cs typeface="Times New Roman" panose="02020603050405020304" pitchFamily="18" charset="0"/>
+              </a:rPr>
+              <a:t>with colon(:). </a:t>
+            </a:r>
+            <a:r>
+              <a:rPr lang="id-ID" dirty="0">
+                <a:latin typeface="Times New Roman" panose="02020603050405020304" pitchFamily="18" charset="0"/>
+                <a:cs typeface="Times New Roman" panose="02020603050405020304" pitchFamily="18" charset="0"/>
+              </a:rPr>
+              <a:t>It’s mutable.</a:t>
             </a:r>
           </a:p>
           <a:p>
@@ -6622,7 +6636,7 @@
                 <a:latin typeface="Times New Roman" panose="02020603050405020304" pitchFamily="18" charset="0"/>
                 <a:cs typeface="Times New Roman" panose="02020603050405020304" pitchFamily="18" charset="0"/>
               </a:rPr>
-              <a:t>The first character must be underline character (_), words atau capital.</a:t>
+              <a:t>The first character must be underline character (_), words or capital.</a:t>
             </a:r>
           </a:p>
           <a:p>
@@ -6670,7 +6684,7 @@
                 <a:latin typeface="Times New Roman" panose="02020603050405020304" pitchFamily="18" charset="0"/>
                 <a:cs typeface="Times New Roman" panose="02020603050405020304" pitchFamily="18" charset="0"/>
               </a:rPr>
-              <a:t>Contoh :</a:t>
+              <a:t>Example :</a:t>
             </a:r>
           </a:p>
           <a:p>
@@ -6682,7 +6696,7 @@
                 <a:latin typeface="Times New Roman" panose="02020603050405020304" pitchFamily="18" charset="0"/>
                 <a:cs typeface="Times New Roman" panose="02020603050405020304" pitchFamily="18" charset="0"/>
               </a:rPr>
-              <a:t>_first= 10, First = 20, fist = 30, thefirst = “first”</a:t>
+              <a:t>_first= 10, First = 20, first = 30, thefirst = “first”</a:t>
             </a:r>
           </a:p>
         </p:txBody>

</xml_diff>